<commit_message>
final lesson changes lesson
</commit_message>
<xml_diff>
--- a/ALevel/FSM&TM/FSM&Turing.pptx
+++ b/ALevel/FSM&TM/FSM&Turing.pptx
@@ -3615,17 +3615,17 @@
           <a:lstStyle/>
           <a:p>
             <a:r>
-              <a:rPr lang="en-GB" sz="16500" b="1" dirty="0"/>
-              <a:t>Finite State machines</a:t>
+              <a:rPr lang="en-GB" sz="13800" b="1" dirty="0"/>
+              <a:t>Abstraction, Automation, Finite State machines</a:t>
             </a:r>
             <a:br>
-              <a:rPr lang="en-GB" sz="16500" b="1" dirty="0"/>
+              <a:rPr lang="en-GB" sz="13800" b="1" dirty="0"/>
             </a:br>
             <a:r>
-              <a:rPr lang="en-GB" sz="16500" b="1" dirty="0"/>
+              <a:rPr lang="en-GB" sz="13800" b="1" dirty="0"/>
               <a:t>&amp; Turing machines</a:t>
             </a:r>
-            <a:endParaRPr sz="16500" b="1" dirty="0"/>
+            <a:endParaRPr sz="13800" b="1" dirty="0"/>
           </a:p>
         </p:txBody>
       </p:sp>
@@ -4129,7 +4129,7 @@
                   <a:noFill/>
                 </a:ln>
                 <a:solidFill>
-                  <a:srgbClr val="000000"/>
+                  <a:schemeClr val="bg1"/>
                 </a:solidFill>
                 <a:effectLst/>
                 <a:uFillTx/>
@@ -4267,7 +4267,7 @@
             </a:r>
             <a:r>
               <a:rPr lang="en-US" sz="5400" b="1" dirty="0"/>
-              <a:t>. 101 -&gt; NO</a:t>
+              <a:t>. 101 -&gt; </a:t>
             </a:r>
           </a:p>
           <a:p>
@@ -4300,7 +4300,7 @@
                 <a:cs typeface="Proxima Nova"/>
                 <a:sym typeface="Proxima Nova"/>
               </a:rPr>
-              <a:t>	ii. 000 -&gt; NO</a:t>
+              <a:t>	ii. 000 -&gt;</a:t>
             </a:r>
           </a:p>
           <a:p>
@@ -4320,15 +4320,24 @@
             </a:pPr>
             <a:r>
               <a:rPr lang="en-US" sz="5400" b="1" dirty="0"/>
-              <a:t>	iii. 001 -&gt; YES “</a:t>
+              <a:t>	iii. 001 -&gt; </a:t>
             </a:r>
             <a:r>
-              <a:rPr lang="en-US" sz="5400" b="1" dirty="0" err="1"/>
-              <a:t>bzf</a:t>
-            </a:r>
-            <a:r>
-              <a:rPr lang="en-US" sz="5400" b="1" dirty="0"/>
-              <a:t>”</a:t>
+              <a:rPr kumimoji="0" lang="en-US" sz="5400" b="1" i="0" u="none" strike="noStrike" cap="none" spc="0" normalizeH="0" dirty="0">
+                <a:ln>
+                  <a:noFill/>
+                </a:ln>
+                <a:solidFill>
+                  <a:srgbClr val="000000"/>
+                </a:solidFill>
+                <a:effectLst/>
+                <a:uFillTx/>
+                <a:latin typeface="Proxima Nova"/>
+                <a:ea typeface="Proxima Nova"/>
+                <a:cs typeface="Proxima Nova"/>
+                <a:sym typeface="Proxima Nova"/>
+              </a:rPr>
+              <a:t>	</a:t>
             </a:r>
           </a:p>
           <a:p>
@@ -4361,7 +4370,7 @@
                 <a:cs typeface="Proxima Nova"/>
                 <a:sym typeface="Proxima Nova"/>
               </a:rPr>
-              <a:t>	iv. 010001101 -&gt; NO</a:t>
+              <a:t>	iv. 010001101 -&gt; </a:t>
             </a:r>
           </a:p>
           <a:p>
@@ -4381,15 +4390,7 @@
             </a:pPr>
             <a:r>
               <a:rPr lang="en-US" sz="5400" b="1" dirty="0"/>
-              <a:t>	v. 0100011011 -&gt; YES “</a:t>
-            </a:r>
-            <a:r>
-              <a:rPr lang="en-US" sz="5400" b="1" dirty="0" err="1"/>
-              <a:t>bfgggpdgpd</a:t>
-            </a:r>
-            <a:r>
-              <a:rPr lang="en-US" sz="5400" b="1" dirty="0"/>
-              <a:t>”</a:t>
+              <a:t>	v. 0100011011 -&gt; </a:t>
             </a:r>
           </a:p>
           <a:p>
@@ -4480,6 +4481,370 @@
           </a:p>
         </p:txBody>
       </p:sp>
+      <p:sp>
+        <p:nvSpPr>
+          <p:cNvPr id="3" name="TextBox 2">
+            <a:extLst>
+              <a:ext uri="{FF2B5EF4-FFF2-40B4-BE49-F238E27FC236}">
+                <a16:creationId xmlns:a16="http://schemas.microsoft.com/office/drawing/2014/main" id="{6390C71C-05D4-8675-CBA2-8FA1D57043E1}"/>
+              </a:ext>
+            </a:extLst>
+          </p:cNvPr>
+          <p:cNvSpPr txBox="1"/>
+          <p:nvPr/>
+        </p:nvSpPr>
+        <p:spPr>
+          <a:xfrm>
+            <a:off x="14535150" y="4760268"/>
+            <a:ext cx="12204700" cy="923330"/>
+          </a:xfrm>
+          <a:prstGeom prst="rect">
+            <a:avLst/>
+          </a:prstGeom>
+          <a:noFill/>
+          <a:ln w="12700" cap="flat">
+            <a:noFill/>
+            <a:miter lim="400000"/>
+          </a:ln>
+          <a:effectLst/>
+          <a:sp3d/>
+        </p:spPr>
+        <p:style>
+          <a:lnRef idx="0">
+            <a:scrgbClr r="0" g="0" b="0"/>
+          </a:lnRef>
+          <a:fillRef idx="0">
+            <a:scrgbClr r="0" g="0" b="0"/>
+          </a:fillRef>
+          <a:effectRef idx="0">
+            <a:scrgbClr r="0" g="0" b="0"/>
+          </a:effectRef>
+          <a:fontRef idx="none"/>
+        </p:style>
+        <p:txBody>
+          <a:bodyPr wrap="square">
+            <a:spAutoFit/>
+          </a:bodyPr>
+          <a:lstStyle/>
+          <a:p>
+            <a:pPr marR="0" algn="l" defTabSz="825500" rtl="0" fontAlgn="auto" latinLnBrk="0" hangingPunct="0">
+              <a:lnSpc>
+                <a:spcPct val="100000"/>
+              </a:lnSpc>
+              <a:spcBef>
+                <a:spcPts val="0"/>
+              </a:spcBef>
+              <a:spcAft>
+                <a:spcPts val="0"/>
+              </a:spcAft>
+              <a:buClrTx/>
+              <a:buSzTx/>
+              <a:tabLst/>
+            </a:pPr>
+            <a:r>
+              <a:rPr lang="en-US" sz="5400" b="1" dirty="0"/>
+              <a:t>NO</a:t>
+            </a:r>
+          </a:p>
+        </p:txBody>
+      </p:sp>
+      <p:sp>
+        <p:nvSpPr>
+          <p:cNvPr id="8" name="TextBox 7">
+            <a:extLst>
+              <a:ext uri="{FF2B5EF4-FFF2-40B4-BE49-F238E27FC236}">
+                <a16:creationId xmlns:a16="http://schemas.microsoft.com/office/drawing/2014/main" id="{829954CE-5419-6681-5CE6-AD6A54ECBF46}"/>
+              </a:ext>
+            </a:extLst>
+          </p:cNvPr>
+          <p:cNvSpPr txBox="1"/>
+          <p:nvPr/>
+        </p:nvSpPr>
+        <p:spPr>
+          <a:xfrm>
+            <a:off x="14916150" y="5526733"/>
+            <a:ext cx="13373100" cy="923330"/>
+          </a:xfrm>
+          <a:prstGeom prst="rect">
+            <a:avLst/>
+          </a:prstGeom>
+          <a:noFill/>
+          <a:ln w="12700" cap="flat">
+            <a:noFill/>
+            <a:miter lim="400000"/>
+          </a:ln>
+          <a:effectLst/>
+          <a:sp3d/>
+        </p:spPr>
+        <p:style>
+          <a:lnRef idx="0">
+            <a:scrgbClr r="0" g="0" b="0"/>
+          </a:lnRef>
+          <a:fillRef idx="0">
+            <a:scrgbClr r="0" g="0" b="0"/>
+          </a:fillRef>
+          <a:effectRef idx="0">
+            <a:scrgbClr r="0" g="0" b="0"/>
+          </a:effectRef>
+          <a:fontRef idx="none"/>
+        </p:style>
+        <p:txBody>
+          <a:bodyPr wrap="square">
+            <a:spAutoFit/>
+          </a:bodyPr>
+          <a:lstStyle/>
+          <a:p>
+            <a:pPr marR="0" algn="l" defTabSz="825500" rtl="0" fontAlgn="auto" latinLnBrk="0" hangingPunct="0">
+              <a:lnSpc>
+                <a:spcPct val="100000"/>
+              </a:lnSpc>
+              <a:spcBef>
+                <a:spcPts val="0"/>
+              </a:spcBef>
+              <a:spcAft>
+                <a:spcPts val="0"/>
+              </a:spcAft>
+              <a:buClrTx/>
+              <a:buSzTx/>
+              <a:tabLst/>
+            </a:pPr>
+            <a:r>
+              <a:rPr lang="en-US" sz="5400" b="1" dirty="0"/>
+              <a:t>NO</a:t>
+            </a:r>
+          </a:p>
+        </p:txBody>
+      </p:sp>
+      <p:sp>
+        <p:nvSpPr>
+          <p:cNvPr id="10" name="TextBox 9">
+            <a:extLst>
+              <a:ext uri="{FF2B5EF4-FFF2-40B4-BE49-F238E27FC236}">
+                <a16:creationId xmlns:a16="http://schemas.microsoft.com/office/drawing/2014/main" id="{5206669A-25D2-3A61-655D-A5F18925612E}"/>
+              </a:ext>
+            </a:extLst>
+          </p:cNvPr>
+          <p:cNvSpPr txBox="1"/>
+          <p:nvPr/>
+        </p:nvSpPr>
+        <p:spPr>
+          <a:xfrm>
+            <a:off x="14998700" y="6373863"/>
+            <a:ext cx="14147800" cy="923330"/>
+          </a:xfrm>
+          <a:prstGeom prst="rect">
+            <a:avLst/>
+          </a:prstGeom>
+          <a:noFill/>
+          <a:ln w="12700" cap="flat">
+            <a:noFill/>
+            <a:miter lim="400000"/>
+          </a:ln>
+          <a:effectLst/>
+          <a:sp3d/>
+        </p:spPr>
+        <p:style>
+          <a:lnRef idx="0">
+            <a:scrgbClr r="0" g="0" b="0"/>
+          </a:lnRef>
+          <a:fillRef idx="0">
+            <a:scrgbClr r="0" g="0" b="0"/>
+          </a:fillRef>
+          <a:effectRef idx="0">
+            <a:scrgbClr r="0" g="0" b="0"/>
+          </a:effectRef>
+          <a:fontRef idx="none"/>
+        </p:style>
+        <p:txBody>
+          <a:bodyPr wrap="square">
+            <a:spAutoFit/>
+          </a:bodyPr>
+          <a:lstStyle/>
+          <a:p>
+            <a:pPr marR="0" algn="l" defTabSz="825500" rtl="0" fontAlgn="auto" latinLnBrk="0" hangingPunct="0">
+              <a:lnSpc>
+                <a:spcPct val="100000"/>
+              </a:lnSpc>
+              <a:spcBef>
+                <a:spcPts val="0"/>
+              </a:spcBef>
+              <a:spcAft>
+                <a:spcPts val="0"/>
+              </a:spcAft>
+              <a:buClrTx/>
+              <a:buSzTx/>
+              <a:tabLst/>
+            </a:pPr>
+            <a:r>
+              <a:rPr lang="en-US" sz="5400" b="1" dirty="0"/>
+              <a:t>YES “</a:t>
+            </a:r>
+            <a:r>
+              <a:rPr lang="en-US" sz="5400" b="1" dirty="0" err="1"/>
+              <a:t>bzf</a:t>
+            </a:r>
+            <a:r>
+              <a:rPr lang="en-US" sz="5400" b="1" dirty="0"/>
+              <a:t>”</a:t>
+            </a:r>
+          </a:p>
+        </p:txBody>
+      </p:sp>
+      <p:sp>
+        <p:nvSpPr>
+          <p:cNvPr id="12" name="TextBox 11">
+            <a:extLst>
+              <a:ext uri="{FF2B5EF4-FFF2-40B4-BE49-F238E27FC236}">
+                <a16:creationId xmlns:a16="http://schemas.microsoft.com/office/drawing/2014/main" id="{ECBFF229-2F6C-91A0-CD85-1412C17FC0ED}"/>
+              </a:ext>
+            </a:extLst>
+          </p:cNvPr>
+          <p:cNvSpPr txBox="1"/>
+          <p:nvPr/>
+        </p:nvSpPr>
+        <p:spPr>
+          <a:xfrm>
+            <a:off x="17170400" y="7165728"/>
+            <a:ext cx="14579600" cy="923330"/>
+          </a:xfrm>
+          <a:prstGeom prst="rect">
+            <a:avLst/>
+          </a:prstGeom>
+          <a:noFill/>
+          <a:ln w="12700" cap="flat">
+            <a:noFill/>
+            <a:miter lim="400000"/>
+          </a:ln>
+          <a:effectLst/>
+          <a:sp3d/>
+        </p:spPr>
+        <p:style>
+          <a:lnRef idx="0">
+            <a:scrgbClr r="0" g="0" b="0"/>
+          </a:lnRef>
+          <a:fillRef idx="0">
+            <a:scrgbClr r="0" g="0" b="0"/>
+          </a:fillRef>
+          <a:effectRef idx="0">
+            <a:scrgbClr r="0" g="0" b="0"/>
+          </a:effectRef>
+          <a:fontRef idx="none"/>
+        </p:style>
+        <p:txBody>
+          <a:bodyPr wrap="square">
+            <a:spAutoFit/>
+          </a:bodyPr>
+          <a:lstStyle/>
+          <a:p>
+            <a:pPr marR="0" algn="l" defTabSz="825500" rtl="0" fontAlgn="auto" latinLnBrk="0" hangingPunct="0">
+              <a:lnSpc>
+                <a:spcPct val="100000"/>
+              </a:lnSpc>
+              <a:spcBef>
+                <a:spcPts val="0"/>
+              </a:spcBef>
+              <a:spcAft>
+                <a:spcPts val="0"/>
+              </a:spcAft>
+              <a:buClrTx/>
+              <a:buSzTx/>
+              <a:tabLst/>
+            </a:pPr>
+            <a:r>
+              <a:rPr kumimoji="0" lang="en-US" sz="5400" b="1" i="0" u="none" strike="noStrike" cap="none" spc="0" normalizeH="0" dirty="0">
+                <a:ln>
+                  <a:noFill/>
+                </a:ln>
+                <a:solidFill>
+                  <a:srgbClr val="000000"/>
+                </a:solidFill>
+                <a:effectLst/>
+                <a:uFillTx/>
+                <a:latin typeface="Proxima Nova"/>
+                <a:ea typeface="Proxima Nova"/>
+                <a:cs typeface="Proxima Nova"/>
+                <a:sym typeface="Proxima Nova"/>
+              </a:rPr>
+              <a:t>NO</a:t>
+            </a:r>
+          </a:p>
+        </p:txBody>
+      </p:sp>
+      <p:sp>
+        <p:nvSpPr>
+          <p:cNvPr id="14" name="TextBox 13">
+            <a:extLst>
+              <a:ext uri="{FF2B5EF4-FFF2-40B4-BE49-F238E27FC236}">
+                <a16:creationId xmlns:a16="http://schemas.microsoft.com/office/drawing/2014/main" id="{780C6903-994A-33AF-ECB1-162FFA5356ED}"/>
+              </a:ext>
+            </a:extLst>
+          </p:cNvPr>
+          <p:cNvSpPr txBox="1"/>
+          <p:nvPr/>
+        </p:nvSpPr>
+        <p:spPr>
+          <a:xfrm>
+            <a:off x="17170400" y="8033793"/>
+            <a:ext cx="15875000" cy="923330"/>
+          </a:xfrm>
+          <a:prstGeom prst="rect">
+            <a:avLst/>
+          </a:prstGeom>
+          <a:noFill/>
+          <a:ln w="12700" cap="flat">
+            <a:noFill/>
+            <a:miter lim="400000"/>
+          </a:ln>
+          <a:effectLst/>
+          <a:sp3d/>
+        </p:spPr>
+        <p:style>
+          <a:lnRef idx="0">
+            <a:scrgbClr r="0" g="0" b="0"/>
+          </a:lnRef>
+          <a:fillRef idx="0">
+            <a:scrgbClr r="0" g="0" b="0"/>
+          </a:fillRef>
+          <a:effectRef idx="0">
+            <a:scrgbClr r="0" g="0" b="0"/>
+          </a:effectRef>
+          <a:fontRef idx="none"/>
+        </p:style>
+        <p:txBody>
+          <a:bodyPr wrap="square">
+            <a:spAutoFit/>
+          </a:bodyPr>
+          <a:lstStyle/>
+          <a:p>
+            <a:pPr marR="0" algn="l" defTabSz="825500" rtl="0" fontAlgn="auto" latinLnBrk="0" hangingPunct="0">
+              <a:lnSpc>
+                <a:spcPct val="100000"/>
+              </a:lnSpc>
+              <a:spcBef>
+                <a:spcPts val="0"/>
+              </a:spcBef>
+              <a:spcAft>
+                <a:spcPts val="0"/>
+              </a:spcAft>
+              <a:buClrTx/>
+              <a:buSzTx/>
+              <a:tabLst/>
+            </a:pPr>
+            <a:r>
+              <a:rPr lang="en-US" sz="5400" b="1" dirty="0"/>
+              <a:t>YES “</a:t>
+            </a:r>
+            <a:r>
+              <a:rPr lang="en-US" sz="5400" b="1" dirty="0" err="1"/>
+              <a:t>bfgggpdgpd</a:t>
+            </a:r>
+            <a:r>
+              <a:rPr lang="en-US" sz="5400" b="1" dirty="0"/>
+              <a:t>”</a:t>
+            </a:r>
+          </a:p>
+        </p:txBody>
+      </p:sp>
     </p:spTree>
     <p:extLst>
       <p:ext uri="{BB962C8B-B14F-4D97-AF65-F5344CB8AC3E}">
@@ -4491,6 +4856,759 @@
     <a:masterClrMapping/>
   </p:clrMapOvr>
   <p:transition spd="med"/>
+  <p:timing>
+    <p:tnLst>
+      <p:par>
+        <p:cTn id="1" dur="indefinite" restart="never" nodeType="tmRoot">
+          <p:childTnLst>
+            <p:seq concurrent="1" nextAc="seek">
+              <p:cTn id="2" dur="indefinite" nodeType="mainSeq">
+                <p:childTnLst>
+                  <p:par>
+                    <p:cTn id="3" fill="hold">
+                      <p:stCondLst>
+                        <p:cond delay="indefinite"/>
+                      </p:stCondLst>
+                      <p:childTnLst>
+                        <p:par>
+                          <p:cTn id="4" fill="hold">
+                            <p:stCondLst>
+                              <p:cond delay="0"/>
+                            </p:stCondLst>
+                            <p:childTnLst>
+                              <p:par>
+                                <p:cTn id="5" presetID="1" presetClass="entr" presetSubtype="0" fill="hold" grpId="0" nodeType="clickEffect">
+                                  <p:stCondLst>
+                                    <p:cond delay="0"/>
+                                  </p:stCondLst>
+                                  <p:childTnLst>
+                                    <p:set>
+                                      <p:cBhvr>
+                                        <p:cTn id="6" dur="1" fill="hold">
+                                          <p:stCondLst>
+                                            <p:cond delay="0"/>
+                                          </p:stCondLst>
+                                        </p:cTn>
+                                        <p:tgtEl>
+                                          <p:spTgt spid="5">
+                                            <p:txEl>
+                                              <p:pRg st="1" end="1"/>
+                                            </p:txEl>
+                                          </p:spTgt>
+                                        </p:tgtEl>
+                                        <p:attrNameLst>
+                                          <p:attrName>style.visibility</p:attrName>
+                                        </p:attrNameLst>
+                                      </p:cBhvr>
+                                      <p:to>
+                                        <p:strVal val="visible"/>
+                                      </p:to>
+                                    </p:set>
+                                  </p:childTnLst>
+                                </p:cTn>
+                              </p:par>
+                            </p:childTnLst>
+                          </p:cTn>
+                        </p:par>
+                      </p:childTnLst>
+                    </p:cTn>
+                  </p:par>
+                  <p:par>
+                    <p:cTn id="7" fill="hold">
+                      <p:stCondLst>
+                        <p:cond delay="indefinite"/>
+                      </p:stCondLst>
+                      <p:childTnLst>
+                        <p:par>
+                          <p:cTn id="8" fill="hold">
+                            <p:stCondLst>
+                              <p:cond delay="0"/>
+                            </p:stCondLst>
+                            <p:childTnLst>
+                              <p:par>
+                                <p:cTn id="9" presetID="1" presetClass="entr" presetSubtype="0" fill="hold" grpId="0" nodeType="clickEffect">
+                                  <p:stCondLst>
+                                    <p:cond delay="0"/>
+                                  </p:stCondLst>
+                                  <p:childTnLst>
+                                    <p:set>
+                                      <p:cBhvr>
+                                        <p:cTn id="10" dur="1" fill="hold">
+                                          <p:stCondLst>
+                                            <p:cond delay="0"/>
+                                          </p:stCondLst>
+                                        </p:cTn>
+                                        <p:tgtEl>
+                                          <p:spTgt spid="5">
+                                            <p:txEl>
+                                              <p:pRg st="2" end="2"/>
+                                            </p:txEl>
+                                          </p:spTgt>
+                                        </p:tgtEl>
+                                        <p:attrNameLst>
+                                          <p:attrName>style.visibility</p:attrName>
+                                        </p:attrNameLst>
+                                      </p:cBhvr>
+                                      <p:to>
+                                        <p:strVal val="visible"/>
+                                      </p:to>
+                                    </p:set>
+                                  </p:childTnLst>
+                                </p:cTn>
+                              </p:par>
+                            </p:childTnLst>
+                          </p:cTn>
+                        </p:par>
+                      </p:childTnLst>
+                    </p:cTn>
+                  </p:par>
+                  <p:par>
+                    <p:cTn id="11" fill="hold">
+                      <p:stCondLst>
+                        <p:cond delay="indefinite"/>
+                      </p:stCondLst>
+                      <p:childTnLst>
+                        <p:par>
+                          <p:cTn id="12" fill="hold">
+                            <p:stCondLst>
+                              <p:cond delay="0"/>
+                            </p:stCondLst>
+                            <p:childTnLst>
+                              <p:par>
+                                <p:cTn id="13" presetID="1" presetClass="entr" presetSubtype="0" fill="hold" grpId="0" nodeType="clickEffect">
+                                  <p:stCondLst>
+                                    <p:cond delay="0"/>
+                                  </p:stCondLst>
+                                  <p:childTnLst>
+                                    <p:set>
+                                      <p:cBhvr>
+                                        <p:cTn id="14" dur="1" fill="hold">
+                                          <p:stCondLst>
+                                            <p:cond delay="0"/>
+                                          </p:stCondLst>
+                                        </p:cTn>
+                                        <p:tgtEl>
+                                          <p:spTgt spid="5">
+                                            <p:txEl>
+                                              <p:pRg st="3" end="3"/>
+                                            </p:txEl>
+                                          </p:spTgt>
+                                        </p:tgtEl>
+                                        <p:attrNameLst>
+                                          <p:attrName>style.visibility</p:attrName>
+                                        </p:attrNameLst>
+                                      </p:cBhvr>
+                                      <p:to>
+                                        <p:strVal val="visible"/>
+                                      </p:to>
+                                    </p:set>
+                                  </p:childTnLst>
+                                </p:cTn>
+                              </p:par>
+                            </p:childTnLst>
+                          </p:cTn>
+                        </p:par>
+                      </p:childTnLst>
+                    </p:cTn>
+                  </p:par>
+                  <p:par>
+                    <p:cTn id="15" fill="hold">
+                      <p:stCondLst>
+                        <p:cond delay="indefinite"/>
+                      </p:stCondLst>
+                      <p:childTnLst>
+                        <p:par>
+                          <p:cTn id="16" fill="hold">
+                            <p:stCondLst>
+                              <p:cond delay="0"/>
+                            </p:stCondLst>
+                            <p:childTnLst>
+                              <p:par>
+                                <p:cTn id="17" presetID="1" presetClass="entr" presetSubtype="0" fill="hold" grpId="0" nodeType="clickEffect">
+                                  <p:stCondLst>
+                                    <p:cond delay="0"/>
+                                  </p:stCondLst>
+                                  <p:childTnLst>
+                                    <p:set>
+                                      <p:cBhvr>
+                                        <p:cTn id="18" dur="1" fill="hold">
+                                          <p:stCondLst>
+                                            <p:cond delay="0"/>
+                                          </p:stCondLst>
+                                        </p:cTn>
+                                        <p:tgtEl>
+                                          <p:spTgt spid="3"/>
+                                        </p:tgtEl>
+                                        <p:attrNameLst>
+                                          <p:attrName>style.visibility</p:attrName>
+                                        </p:attrNameLst>
+                                      </p:cBhvr>
+                                      <p:to>
+                                        <p:strVal val="visible"/>
+                                      </p:to>
+                                    </p:set>
+                                  </p:childTnLst>
+                                </p:cTn>
+                              </p:par>
+                            </p:childTnLst>
+                          </p:cTn>
+                        </p:par>
+                      </p:childTnLst>
+                    </p:cTn>
+                  </p:par>
+                  <p:par>
+                    <p:cTn id="19" fill="hold">
+                      <p:stCondLst>
+                        <p:cond delay="indefinite"/>
+                      </p:stCondLst>
+                      <p:childTnLst>
+                        <p:par>
+                          <p:cTn id="20" fill="hold">
+                            <p:stCondLst>
+                              <p:cond delay="0"/>
+                            </p:stCondLst>
+                            <p:childTnLst>
+                              <p:par>
+                                <p:cTn id="21" presetID="1" presetClass="entr" presetSubtype="0" fill="hold" grpId="0" nodeType="clickEffect">
+                                  <p:stCondLst>
+                                    <p:cond delay="0"/>
+                                  </p:stCondLst>
+                                  <p:childTnLst>
+                                    <p:set>
+                                      <p:cBhvr>
+                                        <p:cTn id="22" dur="1" fill="hold">
+                                          <p:stCondLst>
+                                            <p:cond delay="0"/>
+                                          </p:stCondLst>
+                                        </p:cTn>
+                                        <p:tgtEl>
+                                          <p:spTgt spid="5">
+                                            <p:txEl>
+                                              <p:pRg st="4" end="4"/>
+                                            </p:txEl>
+                                          </p:spTgt>
+                                        </p:tgtEl>
+                                        <p:attrNameLst>
+                                          <p:attrName>style.visibility</p:attrName>
+                                        </p:attrNameLst>
+                                      </p:cBhvr>
+                                      <p:to>
+                                        <p:strVal val="visible"/>
+                                      </p:to>
+                                    </p:set>
+                                  </p:childTnLst>
+                                </p:cTn>
+                              </p:par>
+                            </p:childTnLst>
+                          </p:cTn>
+                        </p:par>
+                      </p:childTnLst>
+                    </p:cTn>
+                  </p:par>
+                  <p:par>
+                    <p:cTn id="23" fill="hold">
+                      <p:stCondLst>
+                        <p:cond delay="indefinite"/>
+                      </p:stCondLst>
+                      <p:childTnLst>
+                        <p:par>
+                          <p:cTn id="24" fill="hold">
+                            <p:stCondLst>
+                              <p:cond delay="0"/>
+                            </p:stCondLst>
+                            <p:childTnLst>
+                              <p:par>
+                                <p:cTn id="25" presetID="1" presetClass="entr" presetSubtype="0" fill="hold" grpId="0" nodeType="clickEffect">
+                                  <p:stCondLst>
+                                    <p:cond delay="0"/>
+                                  </p:stCondLst>
+                                  <p:childTnLst>
+                                    <p:set>
+                                      <p:cBhvr>
+                                        <p:cTn id="26" dur="1" fill="hold">
+                                          <p:stCondLst>
+                                            <p:cond delay="0"/>
+                                          </p:stCondLst>
+                                        </p:cTn>
+                                        <p:tgtEl>
+                                          <p:spTgt spid="8"/>
+                                        </p:tgtEl>
+                                        <p:attrNameLst>
+                                          <p:attrName>style.visibility</p:attrName>
+                                        </p:attrNameLst>
+                                      </p:cBhvr>
+                                      <p:to>
+                                        <p:strVal val="visible"/>
+                                      </p:to>
+                                    </p:set>
+                                  </p:childTnLst>
+                                </p:cTn>
+                              </p:par>
+                            </p:childTnLst>
+                          </p:cTn>
+                        </p:par>
+                      </p:childTnLst>
+                    </p:cTn>
+                  </p:par>
+                  <p:par>
+                    <p:cTn id="27" fill="hold">
+                      <p:stCondLst>
+                        <p:cond delay="indefinite"/>
+                      </p:stCondLst>
+                      <p:childTnLst>
+                        <p:par>
+                          <p:cTn id="28" fill="hold">
+                            <p:stCondLst>
+                              <p:cond delay="0"/>
+                            </p:stCondLst>
+                            <p:childTnLst>
+                              <p:par>
+                                <p:cTn id="29" presetID="1" presetClass="entr" presetSubtype="0" fill="hold" grpId="0" nodeType="clickEffect">
+                                  <p:stCondLst>
+                                    <p:cond delay="0"/>
+                                  </p:stCondLst>
+                                  <p:childTnLst>
+                                    <p:set>
+                                      <p:cBhvr>
+                                        <p:cTn id="30" dur="1" fill="hold">
+                                          <p:stCondLst>
+                                            <p:cond delay="0"/>
+                                          </p:stCondLst>
+                                        </p:cTn>
+                                        <p:tgtEl>
+                                          <p:spTgt spid="5">
+                                            <p:txEl>
+                                              <p:pRg st="5" end="5"/>
+                                            </p:txEl>
+                                          </p:spTgt>
+                                        </p:tgtEl>
+                                        <p:attrNameLst>
+                                          <p:attrName>style.visibility</p:attrName>
+                                        </p:attrNameLst>
+                                      </p:cBhvr>
+                                      <p:to>
+                                        <p:strVal val="visible"/>
+                                      </p:to>
+                                    </p:set>
+                                  </p:childTnLst>
+                                </p:cTn>
+                              </p:par>
+                            </p:childTnLst>
+                          </p:cTn>
+                        </p:par>
+                      </p:childTnLst>
+                    </p:cTn>
+                  </p:par>
+                  <p:par>
+                    <p:cTn id="31" fill="hold">
+                      <p:stCondLst>
+                        <p:cond delay="indefinite"/>
+                      </p:stCondLst>
+                      <p:childTnLst>
+                        <p:par>
+                          <p:cTn id="32" fill="hold">
+                            <p:stCondLst>
+                              <p:cond delay="0"/>
+                            </p:stCondLst>
+                            <p:childTnLst>
+                              <p:par>
+                                <p:cTn id="33" presetID="1" presetClass="entr" presetSubtype="0" fill="hold" grpId="0" nodeType="clickEffect">
+                                  <p:stCondLst>
+                                    <p:cond delay="0"/>
+                                  </p:stCondLst>
+                                  <p:childTnLst>
+                                    <p:set>
+                                      <p:cBhvr>
+                                        <p:cTn id="34" dur="1" fill="hold">
+                                          <p:stCondLst>
+                                            <p:cond delay="0"/>
+                                          </p:stCondLst>
+                                        </p:cTn>
+                                        <p:tgtEl>
+                                          <p:spTgt spid="10"/>
+                                        </p:tgtEl>
+                                        <p:attrNameLst>
+                                          <p:attrName>style.visibility</p:attrName>
+                                        </p:attrNameLst>
+                                      </p:cBhvr>
+                                      <p:to>
+                                        <p:strVal val="visible"/>
+                                      </p:to>
+                                    </p:set>
+                                  </p:childTnLst>
+                                </p:cTn>
+                              </p:par>
+                            </p:childTnLst>
+                          </p:cTn>
+                        </p:par>
+                      </p:childTnLst>
+                    </p:cTn>
+                  </p:par>
+                  <p:par>
+                    <p:cTn id="35" fill="hold">
+                      <p:stCondLst>
+                        <p:cond delay="indefinite"/>
+                      </p:stCondLst>
+                      <p:childTnLst>
+                        <p:par>
+                          <p:cTn id="36" fill="hold">
+                            <p:stCondLst>
+                              <p:cond delay="0"/>
+                            </p:stCondLst>
+                            <p:childTnLst>
+                              <p:par>
+                                <p:cTn id="37" presetID="1" presetClass="entr" presetSubtype="0" fill="hold" grpId="0" nodeType="clickEffect">
+                                  <p:stCondLst>
+                                    <p:cond delay="0"/>
+                                  </p:stCondLst>
+                                  <p:childTnLst>
+                                    <p:set>
+                                      <p:cBhvr>
+                                        <p:cTn id="38" dur="1" fill="hold">
+                                          <p:stCondLst>
+                                            <p:cond delay="0"/>
+                                          </p:stCondLst>
+                                        </p:cTn>
+                                        <p:tgtEl>
+                                          <p:spTgt spid="5">
+                                            <p:txEl>
+                                              <p:pRg st="6" end="6"/>
+                                            </p:txEl>
+                                          </p:spTgt>
+                                        </p:tgtEl>
+                                        <p:attrNameLst>
+                                          <p:attrName>style.visibility</p:attrName>
+                                        </p:attrNameLst>
+                                      </p:cBhvr>
+                                      <p:to>
+                                        <p:strVal val="visible"/>
+                                      </p:to>
+                                    </p:set>
+                                  </p:childTnLst>
+                                </p:cTn>
+                              </p:par>
+                            </p:childTnLst>
+                          </p:cTn>
+                        </p:par>
+                      </p:childTnLst>
+                    </p:cTn>
+                  </p:par>
+                  <p:par>
+                    <p:cTn id="39" fill="hold">
+                      <p:stCondLst>
+                        <p:cond delay="indefinite"/>
+                      </p:stCondLst>
+                      <p:childTnLst>
+                        <p:par>
+                          <p:cTn id="40" fill="hold">
+                            <p:stCondLst>
+                              <p:cond delay="0"/>
+                            </p:stCondLst>
+                            <p:childTnLst>
+                              <p:par>
+                                <p:cTn id="41" presetID="1" presetClass="entr" presetSubtype="0" fill="hold" grpId="0" nodeType="clickEffect">
+                                  <p:stCondLst>
+                                    <p:cond delay="0"/>
+                                  </p:stCondLst>
+                                  <p:childTnLst>
+                                    <p:set>
+                                      <p:cBhvr>
+                                        <p:cTn id="42" dur="1" fill="hold">
+                                          <p:stCondLst>
+                                            <p:cond delay="0"/>
+                                          </p:stCondLst>
+                                        </p:cTn>
+                                        <p:tgtEl>
+                                          <p:spTgt spid="12"/>
+                                        </p:tgtEl>
+                                        <p:attrNameLst>
+                                          <p:attrName>style.visibility</p:attrName>
+                                        </p:attrNameLst>
+                                      </p:cBhvr>
+                                      <p:to>
+                                        <p:strVal val="visible"/>
+                                      </p:to>
+                                    </p:set>
+                                  </p:childTnLst>
+                                </p:cTn>
+                              </p:par>
+                            </p:childTnLst>
+                          </p:cTn>
+                        </p:par>
+                      </p:childTnLst>
+                    </p:cTn>
+                  </p:par>
+                  <p:par>
+                    <p:cTn id="43" fill="hold">
+                      <p:stCondLst>
+                        <p:cond delay="indefinite"/>
+                      </p:stCondLst>
+                      <p:childTnLst>
+                        <p:par>
+                          <p:cTn id="44" fill="hold">
+                            <p:stCondLst>
+                              <p:cond delay="0"/>
+                            </p:stCondLst>
+                            <p:childTnLst>
+                              <p:par>
+                                <p:cTn id="45" presetID="1" presetClass="entr" presetSubtype="0" fill="hold" grpId="0" nodeType="clickEffect">
+                                  <p:stCondLst>
+                                    <p:cond delay="0"/>
+                                  </p:stCondLst>
+                                  <p:childTnLst>
+                                    <p:set>
+                                      <p:cBhvr>
+                                        <p:cTn id="46" dur="1" fill="hold">
+                                          <p:stCondLst>
+                                            <p:cond delay="0"/>
+                                          </p:stCondLst>
+                                        </p:cTn>
+                                        <p:tgtEl>
+                                          <p:spTgt spid="5">
+                                            <p:txEl>
+                                              <p:pRg st="7" end="7"/>
+                                            </p:txEl>
+                                          </p:spTgt>
+                                        </p:tgtEl>
+                                        <p:attrNameLst>
+                                          <p:attrName>style.visibility</p:attrName>
+                                        </p:attrNameLst>
+                                      </p:cBhvr>
+                                      <p:to>
+                                        <p:strVal val="visible"/>
+                                      </p:to>
+                                    </p:set>
+                                  </p:childTnLst>
+                                </p:cTn>
+                              </p:par>
+                            </p:childTnLst>
+                          </p:cTn>
+                        </p:par>
+                      </p:childTnLst>
+                    </p:cTn>
+                  </p:par>
+                  <p:par>
+                    <p:cTn id="47" fill="hold">
+                      <p:stCondLst>
+                        <p:cond delay="indefinite"/>
+                      </p:stCondLst>
+                      <p:childTnLst>
+                        <p:par>
+                          <p:cTn id="48" fill="hold">
+                            <p:stCondLst>
+                              <p:cond delay="0"/>
+                            </p:stCondLst>
+                            <p:childTnLst>
+                              <p:par>
+                                <p:cTn id="49" presetID="1" presetClass="entr" presetSubtype="0" fill="hold" grpId="0" nodeType="clickEffect">
+                                  <p:stCondLst>
+                                    <p:cond delay="0"/>
+                                  </p:stCondLst>
+                                  <p:childTnLst>
+                                    <p:set>
+                                      <p:cBhvr>
+                                        <p:cTn id="50" dur="1" fill="hold">
+                                          <p:stCondLst>
+                                            <p:cond delay="0"/>
+                                          </p:stCondLst>
+                                        </p:cTn>
+                                        <p:tgtEl>
+                                          <p:spTgt spid="14"/>
+                                        </p:tgtEl>
+                                        <p:attrNameLst>
+                                          <p:attrName>style.visibility</p:attrName>
+                                        </p:attrNameLst>
+                                      </p:cBhvr>
+                                      <p:to>
+                                        <p:strVal val="visible"/>
+                                      </p:to>
+                                    </p:set>
+                                  </p:childTnLst>
+                                </p:cTn>
+                              </p:par>
+                            </p:childTnLst>
+                          </p:cTn>
+                        </p:par>
+                      </p:childTnLst>
+                    </p:cTn>
+                  </p:par>
+                  <p:par>
+                    <p:cTn id="51" fill="hold">
+                      <p:stCondLst>
+                        <p:cond delay="indefinite"/>
+                      </p:stCondLst>
+                      <p:childTnLst>
+                        <p:par>
+                          <p:cTn id="52" fill="hold">
+                            <p:stCondLst>
+                              <p:cond delay="0"/>
+                            </p:stCondLst>
+                            <p:childTnLst>
+                              <p:par>
+                                <p:cTn id="53" presetID="1" presetClass="entr" presetSubtype="0" fill="hold" grpId="0" nodeType="clickEffect">
+                                  <p:stCondLst>
+                                    <p:cond delay="0"/>
+                                  </p:stCondLst>
+                                  <p:childTnLst>
+                                    <p:set>
+                                      <p:cBhvr>
+                                        <p:cTn id="54" dur="1" fill="hold">
+                                          <p:stCondLst>
+                                            <p:cond delay="0"/>
+                                          </p:stCondLst>
+                                        </p:cTn>
+                                        <p:tgtEl>
+                                          <p:spTgt spid="5">
+                                            <p:txEl>
+                                              <p:pRg st="8" end="8"/>
+                                            </p:txEl>
+                                          </p:spTgt>
+                                        </p:tgtEl>
+                                        <p:attrNameLst>
+                                          <p:attrName>style.visibility</p:attrName>
+                                        </p:attrNameLst>
+                                      </p:cBhvr>
+                                      <p:to>
+                                        <p:strVal val="visible"/>
+                                      </p:to>
+                                    </p:set>
+                                  </p:childTnLst>
+                                </p:cTn>
+                              </p:par>
+                            </p:childTnLst>
+                          </p:cTn>
+                        </p:par>
+                      </p:childTnLst>
+                    </p:cTn>
+                  </p:par>
+                  <p:par>
+                    <p:cTn id="55" fill="hold">
+                      <p:stCondLst>
+                        <p:cond delay="indefinite"/>
+                      </p:stCondLst>
+                      <p:childTnLst>
+                        <p:par>
+                          <p:cTn id="56" fill="hold">
+                            <p:stCondLst>
+                              <p:cond delay="0"/>
+                            </p:stCondLst>
+                            <p:childTnLst>
+                              <p:par>
+                                <p:cTn id="57" presetID="1" presetClass="entr" presetSubtype="0" fill="hold" grpId="0" nodeType="clickEffect">
+                                  <p:stCondLst>
+                                    <p:cond delay="0"/>
+                                  </p:stCondLst>
+                                  <p:childTnLst>
+                                    <p:set>
+                                      <p:cBhvr>
+                                        <p:cTn id="58" dur="1" fill="hold">
+                                          <p:stCondLst>
+                                            <p:cond delay="0"/>
+                                          </p:stCondLst>
+                                        </p:cTn>
+                                        <p:tgtEl>
+                                          <p:spTgt spid="5">
+                                            <p:txEl>
+                                              <p:pRg st="9" end="9"/>
+                                            </p:txEl>
+                                          </p:spTgt>
+                                        </p:tgtEl>
+                                        <p:attrNameLst>
+                                          <p:attrName>style.visibility</p:attrName>
+                                        </p:attrNameLst>
+                                      </p:cBhvr>
+                                      <p:to>
+                                        <p:strVal val="visible"/>
+                                      </p:to>
+                                    </p:set>
+                                  </p:childTnLst>
+                                </p:cTn>
+                              </p:par>
+                            </p:childTnLst>
+                          </p:cTn>
+                        </p:par>
+                      </p:childTnLst>
+                    </p:cTn>
+                  </p:par>
+                  <p:par>
+                    <p:cTn id="59" fill="hold">
+                      <p:stCondLst>
+                        <p:cond delay="indefinite"/>
+                      </p:stCondLst>
+                      <p:childTnLst>
+                        <p:par>
+                          <p:cTn id="60" fill="hold">
+                            <p:stCondLst>
+                              <p:cond delay="0"/>
+                            </p:stCondLst>
+                            <p:childTnLst>
+                              <p:par>
+                                <p:cTn id="61" presetID="1" presetClass="entr" presetSubtype="0" fill="hold" grpId="0" nodeType="clickEffect">
+                                  <p:stCondLst>
+                                    <p:cond delay="0"/>
+                                  </p:stCondLst>
+                                  <p:childTnLst>
+                                    <p:set>
+                                      <p:cBhvr>
+                                        <p:cTn id="62" dur="1" fill="hold">
+                                          <p:stCondLst>
+                                            <p:cond delay="0"/>
+                                          </p:stCondLst>
+                                        </p:cTn>
+                                        <p:tgtEl>
+                                          <p:spTgt spid="5">
+                                            <p:txEl>
+                                              <p:pRg st="10" end="10"/>
+                                            </p:txEl>
+                                          </p:spTgt>
+                                        </p:tgtEl>
+                                        <p:attrNameLst>
+                                          <p:attrName>style.visibility</p:attrName>
+                                        </p:attrNameLst>
+                                      </p:cBhvr>
+                                      <p:to>
+                                        <p:strVal val="visible"/>
+                                      </p:to>
+                                    </p:set>
+                                  </p:childTnLst>
+                                </p:cTn>
+                              </p:par>
+                            </p:childTnLst>
+                          </p:cTn>
+                        </p:par>
+                      </p:childTnLst>
+                    </p:cTn>
+                  </p:par>
+                </p:childTnLst>
+              </p:cTn>
+              <p:prevCondLst>
+                <p:cond evt="onPrev" delay="0">
+                  <p:tgtEl>
+                    <p:sldTgt/>
+                  </p:tgtEl>
+                </p:cond>
+              </p:prevCondLst>
+              <p:nextCondLst>
+                <p:cond evt="onNext" delay="0">
+                  <p:tgtEl>
+                    <p:sldTgt/>
+                  </p:tgtEl>
+                </p:cond>
+              </p:nextCondLst>
+            </p:seq>
+          </p:childTnLst>
+        </p:cTn>
+      </p:par>
+    </p:tnLst>
+    <p:bldLst>
+      <p:bldP spid="5" grpId="0" uiExpand="1" build="p"/>
+      <p:bldP spid="3" grpId="0"/>
+      <p:bldP spid="8" grpId="0"/>
+      <p:bldP spid="10" grpId="0"/>
+      <p:bldP spid="12" grpId="0"/>
+      <p:bldP spid="14" grpId="0"/>
+    </p:bldLst>
+  </p:timing>
 </p:sld>
 </file>
 
@@ -6240,8 +7358,8 @@
           </a:p>
         </p:txBody>
       </p:sp>
-      <mc:AlternateContent xmlns:mc="http://schemas.openxmlformats.org/markup-compatibility/2006">
-        <mc:Choice xmlns:a14="http://schemas.microsoft.com/office/drawing/2010/main" Requires="a14">
+      <mc:AlternateContent xmlns:mc="http://schemas.openxmlformats.org/markup-compatibility/2006" xmlns:a14="http://schemas.microsoft.com/office/drawing/2010/main">
+        <mc:Choice Requires="a14">
           <p:sp>
             <p:nvSpPr>
               <p:cNvPr id="28" name="TextBox 27">
@@ -6578,7 +7696,7 @@
             </p:txBody>
           </p:sp>
         </mc:Choice>
-        <mc:Fallback>
+        <mc:Fallback xmlns="">
           <p:sp>
             <p:nvSpPr>
               <p:cNvPr id="28" name="TextBox 27">
@@ -6628,8 +7746,8 @@
           </p:sp>
         </mc:Fallback>
       </mc:AlternateContent>
-      <mc:AlternateContent xmlns:mc="http://schemas.openxmlformats.org/markup-compatibility/2006">
-        <mc:Choice xmlns:a14="http://schemas.microsoft.com/office/drawing/2010/main" Requires="a14">
+      <mc:AlternateContent xmlns:mc="http://schemas.openxmlformats.org/markup-compatibility/2006" xmlns:a14="http://schemas.microsoft.com/office/drawing/2010/main">
+        <mc:Choice Requires="a14">
           <p:sp>
             <p:nvSpPr>
               <p:cNvPr id="29" name="TextBox 28">
@@ -6734,7 +7852,7 @@
             </p:txBody>
           </p:sp>
         </mc:Choice>
-        <mc:Fallback>
+        <mc:Fallback xmlns="">
           <p:sp>
             <p:nvSpPr>
               <p:cNvPr id="29" name="TextBox 28">
@@ -6784,8 +7902,8 @@
           </p:sp>
         </mc:Fallback>
       </mc:AlternateContent>
-      <mc:AlternateContent xmlns:mc="http://schemas.openxmlformats.org/markup-compatibility/2006">
-        <mc:Choice xmlns:a14="http://schemas.microsoft.com/office/drawing/2010/main" Requires="a14">
+      <mc:AlternateContent xmlns:mc="http://schemas.openxmlformats.org/markup-compatibility/2006" xmlns:a14="http://schemas.microsoft.com/office/drawing/2010/main">
+        <mc:Choice Requires="a14">
           <p:sp>
             <p:nvSpPr>
               <p:cNvPr id="30" name="TextBox 29">
@@ -6890,7 +8008,7 @@
             </p:txBody>
           </p:sp>
         </mc:Choice>
-        <mc:Fallback>
+        <mc:Fallback xmlns="">
           <p:sp>
             <p:nvSpPr>
               <p:cNvPr id="30" name="TextBox 29">
@@ -6940,8 +8058,8 @@
           </p:sp>
         </mc:Fallback>
       </mc:AlternateContent>
-      <mc:AlternateContent xmlns:mc="http://schemas.openxmlformats.org/markup-compatibility/2006">
-        <mc:Choice xmlns:a14="http://schemas.microsoft.com/office/drawing/2010/main" Requires="a14">
+      <mc:AlternateContent xmlns:mc="http://schemas.openxmlformats.org/markup-compatibility/2006" xmlns:a14="http://schemas.microsoft.com/office/drawing/2010/main">
+        <mc:Choice Requires="a14">
           <p:sp>
             <p:nvSpPr>
               <p:cNvPr id="31" name="TextBox 30">
@@ -7083,7 +8201,7 @@
             </p:txBody>
           </p:sp>
         </mc:Choice>
-        <mc:Fallback>
+        <mc:Fallback xmlns="">
           <p:sp>
             <p:nvSpPr>
               <p:cNvPr id="31" name="TextBox 30">
@@ -7133,8 +8251,8 @@
           </p:sp>
         </mc:Fallback>
       </mc:AlternateContent>
-      <mc:AlternateContent xmlns:mc="http://schemas.openxmlformats.org/markup-compatibility/2006">
-        <mc:Choice xmlns:a14="http://schemas.microsoft.com/office/drawing/2010/main" Requires="a14">
+      <mc:AlternateContent xmlns:mc="http://schemas.openxmlformats.org/markup-compatibility/2006" xmlns:a14="http://schemas.microsoft.com/office/drawing/2010/main">
+        <mc:Choice Requires="a14">
           <p:sp>
             <p:nvSpPr>
               <p:cNvPr id="33" name="TextBox 32">
@@ -7251,7 +8369,7 @@
             </p:txBody>
           </p:sp>
         </mc:Choice>
-        <mc:Fallback>
+        <mc:Fallback xmlns="">
           <p:sp>
             <p:nvSpPr>
               <p:cNvPr id="33" name="TextBox 32">
@@ -7301,8 +8419,8 @@
           </p:sp>
         </mc:Fallback>
       </mc:AlternateContent>
-      <mc:AlternateContent xmlns:mc="http://schemas.openxmlformats.org/markup-compatibility/2006">
-        <mc:Choice xmlns:a14="http://schemas.microsoft.com/office/drawing/2010/main" Requires="a14">
+      <mc:AlternateContent xmlns:mc="http://schemas.openxmlformats.org/markup-compatibility/2006" xmlns:a14="http://schemas.microsoft.com/office/drawing/2010/main">
+        <mc:Choice Requires="a14">
           <p:sp>
             <p:nvSpPr>
               <p:cNvPr id="34" name="TextBox 33">
@@ -7437,7 +8555,7 @@
             </p:txBody>
           </p:sp>
         </mc:Choice>
-        <mc:Fallback>
+        <mc:Fallback xmlns="">
           <p:sp>
             <p:nvSpPr>
               <p:cNvPr id="34" name="TextBox 33">
@@ -10928,6 +12046,87 @@
       </p:grpSpPr>
       <p:sp>
         <p:nvSpPr>
+          <p:cNvPr id="4" name="Oval 3">
+            <a:extLst>
+              <a:ext uri="{FF2B5EF4-FFF2-40B4-BE49-F238E27FC236}">
+                <a16:creationId xmlns:a16="http://schemas.microsoft.com/office/drawing/2014/main" id="{AD15A8BA-5E00-0568-BA57-CFF8ADDA3F1C}"/>
+              </a:ext>
+            </a:extLst>
+          </p:cNvPr>
+          <p:cNvSpPr/>
+          <p:nvPr/>
+        </p:nvSpPr>
+        <p:spPr>
+          <a:xfrm>
+            <a:off x="12127026" y="1600200"/>
+            <a:ext cx="2520000" cy="2520000"/>
+          </a:xfrm>
+          <a:prstGeom prst="ellipse">
+            <a:avLst/>
+          </a:prstGeom>
+          <a:solidFill>
+            <a:srgbClr val="FF87BB"/>
+          </a:solidFill>
+          <a:ln w="12700" cap="flat">
+            <a:noFill/>
+            <a:miter lim="400000"/>
+          </a:ln>
+          <a:effectLst/>
+          <a:sp3d/>
+        </p:spPr>
+        <p:style>
+          <a:lnRef idx="0">
+            <a:scrgbClr r="0" g="0" b="0"/>
+          </a:lnRef>
+          <a:fillRef idx="0">
+            <a:scrgbClr r="0" g="0" b="0"/>
+          </a:fillRef>
+          <a:effectRef idx="0">
+            <a:scrgbClr r="0" g="0" b="0"/>
+          </a:effectRef>
+          <a:fontRef idx="none"/>
+        </p:style>
+        <p:txBody>
+          <a:bodyPr rot="0" spcFirstLastPara="1" vertOverflow="overflow" horzOverflow="overflow" vert="horz" wrap="square" lIns="50800" tIns="50800" rIns="50800" bIns="50800" numCol="1" spcCol="38100" rtlCol="0" anchor="ctr">
+            <a:spAutoFit/>
+          </a:bodyPr>
+          <a:lstStyle/>
+          <a:p>
+            <a:pPr marL="0" marR="0" indent="0" algn="ctr" defTabSz="825500" rtl="0" fontAlgn="auto" latinLnBrk="0" hangingPunct="0">
+              <a:lnSpc>
+                <a:spcPct val="120000"/>
+              </a:lnSpc>
+              <a:spcBef>
+                <a:spcPts val="0"/>
+              </a:spcBef>
+              <a:spcAft>
+                <a:spcPts val="0"/>
+              </a:spcAft>
+              <a:buClrTx/>
+              <a:buSzTx/>
+              <a:buFontTx/>
+              <a:buNone/>
+              <a:tabLst/>
+            </a:pPr>
+            <a:endParaRPr kumimoji="0" lang="en-US" sz="3000" b="0" i="0" u="none" strike="noStrike" cap="all" spc="0" normalizeH="0" baseline="0">
+              <a:ln>
+                <a:noFill/>
+              </a:ln>
+              <a:solidFill>
+                <a:srgbClr val="FFFFFF"/>
+              </a:solidFill>
+              <a:effectLst/>
+              <a:uFillTx/>
+              <a:latin typeface="Proxima Nova Extrabold"/>
+              <a:ea typeface="Proxima Nova Extrabold"/>
+              <a:cs typeface="Proxima Nova Extrabold"/>
+              <a:sym typeface="Proxima Nova Extrabold"/>
+            </a:endParaRPr>
+          </a:p>
+        </p:txBody>
+      </p:sp>
+      <p:sp>
+        <p:nvSpPr>
           <p:cNvPr id="6" name="Tips for solving questions">
             <a:extLst>
               <a:ext uri="{FF2B5EF4-FFF2-40B4-BE49-F238E27FC236}">
@@ -11294,7 +12493,7 @@
                     <a:bodyPr/>
                     <a:lstStyle/>
                     <a:p>
-                      <a:endParaRPr lang="en-US" sz="4400">
+                      <a:endParaRPr lang="en-US" sz="4400" dirty="0">
                         <a:solidFill>
                           <a:srgbClr val="FFFFFF"/>
                         </a:solidFill>
@@ -11679,6 +12878,87 @@
           <a:chExt cx="0" cy="0"/>
         </a:xfrm>
       </p:grpSpPr>
+      <p:sp>
+        <p:nvSpPr>
+          <p:cNvPr id="4" name="Oval 3">
+            <a:extLst>
+              <a:ext uri="{FF2B5EF4-FFF2-40B4-BE49-F238E27FC236}">
+                <a16:creationId xmlns:a16="http://schemas.microsoft.com/office/drawing/2014/main" id="{6693F391-F0FE-636C-E606-4D79423004E3}"/>
+              </a:ext>
+            </a:extLst>
+          </p:cNvPr>
+          <p:cNvSpPr/>
+          <p:nvPr/>
+        </p:nvSpPr>
+        <p:spPr>
+          <a:xfrm>
+            <a:off x="16622826" y="1600200"/>
+            <a:ext cx="2520000" cy="2520000"/>
+          </a:xfrm>
+          <a:prstGeom prst="ellipse">
+            <a:avLst/>
+          </a:prstGeom>
+          <a:solidFill>
+            <a:srgbClr val="FF87BB"/>
+          </a:solidFill>
+          <a:ln w="12700" cap="flat">
+            <a:noFill/>
+            <a:miter lim="400000"/>
+          </a:ln>
+          <a:effectLst/>
+          <a:sp3d/>
+        </p:spPr>
+        <p:style>
+          <a:lnRef idx="0">
+            <a:scrgbClr r="0" g="0" b="0"/>
+          </a:lnRef>
+          <a:fillRef idx="0">
+            <a:scrgbClr r="0" g="0" b="0"/>
+          </a:fillRef>
+          <a:effectRef idx="0">
+            <a:scrgbClr r="0" g="0" b="0"/>
+          </a:effectRef>
+          <a:fontRef idx="none"/>
+        </p:style>
+        <p:txBody>
+          <a:bodyPr rot="0" spcFirstLastPara="1" vertOverflow="overflow" horzOverflow="overflow" vert="horz" wrap="square" lIns="50800" tIns="50800" rIns="50800" bIns="50800" numCol="1" spcCol="38100" rtlCol="0" anchor="ctr">
+            <a:spAutoFit/>
+          </a:bodyPr>
+          <a:lstStyle/>
+          <a:p>
+            <a:pPr marL="0" marR="0" indent="0" algn="ctr" defTabSz="825500" rtl="0" fontAlgn="auto" latinLnBrk="0" hangingPunct="0">
+              <a:lnSpc>
+                <a:spcPct val="120000"/>
+              </a:lnSpc>
+              <a:spcBef>
+                <a:spcPts val="0"/>
+              </a:spcBef>
+              <a:spcAft>
+                <a:spcPts val="0"/>
+              </a:spcAft>
+              <a:buClrTx/>
+              <a:buSzTx/>
+              <a:buFontTx/>
+              <a:buNone/>
+              <a:tabLst/>
+            </a:pPr>
+            <a:endParaRPr kumimoji="0" lang="en-US" sz="3000" b="0" i="0" u="none" strike="noStrike" cap="all" spc="0" normalizeH="0" baseline="0">
+              <a:ln>
+                <a:noFill/>
+              </a:ln>
+              <a:solidFill>
+                <a:srgbClr val="FFFFFF"/>
+              </a:solidFill>
+              <a:effectLst/>
+              <a:uFillTx/>
+              <a:latin typeface="Proxima Nova Extrabold"/>
+              <a:ea typeface="Proxima Nova Extrabold"/>
+              <a:cs typeface="Proxima Nova Extrabold"/>
+              <a:sym typeface="Proxima Nova Extrabold"/>
+            </a:endParaRPr>
+          </a:p>
+        </p:txBody>
+      </p:sp>
       <p:sp>
         <p:nvSpPr>
           <p:cNvPr id="6" name="Tips for solving questions">
@@ -12438,6 +13718,87 @@
           <a:chExt cx="0" cy="0"/>
         </a:xfrm>
       </p:grpSpPr>
+      <p:sp>
+        <p:nvSpPr>
+          <p:cNvPr id="4" name="Oval 3">
+            <a:extLst>
+              <a:ext uri="{FF2B5EF4-FFF2-40B4-BE49-F238E27FC236}">
+                <a16:creationId xmlns:a16="http://schemas.microsoft.com/office/drawing/2014/main" id="{684E339E-7367-FCE1-4A94-3FB7AFB9D5CB}"/>
+              </a:ext>
+            </a:extLst>
+          </p:cNvPr>
+          <p:cNvSpPr/>
+          <p:nvPr/>
+        </p:nvSpPr>
+        <p:spPr>
+          <a:xfrm>
+            <a:off x="16603832" y="4611914"/>
+            <a:ext cx="2520000" cy="2520000"/>
+          </a:xfrm>
+          <a:prstGeom prst="ellipse">
+            <a:avLst/>
+          </a:prstGeom>
+          <a:solidFill>
+            <a:srgbClr val="FF87BB"/>
+          </a:solidFill>
+          <a:ln w="12700" cap="flat">
+            <a:noFill/>
+            <a:miter lim="400000"/>
+          </a:ln>
+          <a:effectLst/>
+          <a:sp3d/>
+        </p:spPr>
+        <p:style>
+          <a:lnRef idx="0">
+            <a:scrgbClr r="0" g="0" b="0"/>
+          </a:lnRef>
+          <a:fillRef idx="0">
+            <a:scrgbClr r="0" g="0" b="0"/>
+          </a:fillRef>
+          <a:effectRef idx="0">
+            <a:scrgbClr r="0" g="0" b="0"/>
+          </a:effectRef>
+          <a:fontRef idx="none"/>
+        </p:style>
+        <p:txBody>
+          <a:bodyPr rot="0" spcFirstLastPara="1" vertOverflow="overflow" horzOverflow="overflow" vert="horz" wrap="square" lIns="50800" tIns="50800" rIns="50800" bIns="50800" numCol="1" spcCol="38100" rtlCol="0" anchor="ctr">
+            <a:spAutoFit/>
+          </a:bodyPr>
+          <a:lstStyle/>
+          <a:p>
+            <a:pPr marL="0" marR="0" indent="0" algn="ctr" defTabSz="825500" rtl="0" fontAlgn="auto" latinLnBrk="0" hangingPunct="0">
+              <a:lnSpc>
+                <a:spcPct val="120000"/>
+              </a:lnSpc>
+              <a:spcBef>
+                <a:spcPts val="0"/>
+              </a:spcBef>
+              <a:spcAft>
+                <a:spcPts val="0"/>
+              </a:spcAft>
+              <a:buClrTx/>
+              <a:buSzTx/>
+              <a:buFontTx/>
+              <a:buNone/>
+              <a:tabLst/>
+            </a:pPr>
+            <a:endParaRPr kumimoji="0" lang="en-US" sz="3000" b="0" i="0" u="none" strike="noStrike" cap="all" spc="0" normalizeH="0" baseline="0">
+              <a:ln>
+                <a:noFill/>
+              </a:ln>
+              <a:solidFill>
+                <a:srgbClr val="FFFFFF"/>
+              </a:solidFill>
+              <a:effectLst/>
+              <a:uFillTx/>
+              <a:latin typeface="Proxima Nova Extrabold"/>
+              <a:ea typeface="Proxima Nova Extrabold"/>
+              <a:cs typeface="Proxima Nova Extrabold"/>
+              <a:sym typeface="Proxima Nova Extrabold"/>
+            </a:endParaRPr>
+          </a:p>
+        </p:txBody>
+      </p:sp>
       <p:sp>
         <p:nvSpPr>
           <p:cNvPr id="6" name="Tips for solving questions">
@@ -13203,6 +14564,87 @@
           <a:chExt cx="0" cy="0"/>
         </a:xfrm>
       </p:grpSpPr>
+      <p:sp>
+        <p:nvSpPr>
+          <p:cNvPr id="7" name="Oval 6">
+            <a:extLst>
+              <a:ext uri="{FF2B5EF4-FFF2-40B4-BE49-F238E27FC236}">
+                <a16:creationId xmlns:a16="http://schemas.microsoft.com/office/drawing/2014/main" id="{F3717412-19D2-05D3-DC72-64153C1F42DB}"/>
+              </a:ext>
+            </a:extLst>
+          </p:cNvPr>
+          <p:cNvSpPr/>
+          <p:nvPr/>
+        </p:nvSpPr>
+        <p:spPr>
+          <a:xfrm>
+            <a:off x="16603832" y="4611914"/>
+            <a:ext cx="2520000" cy="2520000"/>
+          </a:xfrm>
+          <a:prstGeom prst="ellipse">
+            <a:avLst/>
+          </a:prstGeom>
+          <a:solidFill>
+            <a:srgbClr val="FF87BB"/>
+          </a:solidFill>
+          <a:ln w="12700" cap="flat">
+            <a:noFill/>
+            <a:miter lim="400000"/>
+          </a:ln>
+          <a:effectLst/>
+          <a:sp3d/>
+        </p:spPr>
+        <p:style>
+          <a:lnRef idx="0">
+            <a:scrgbClr r="0" g="0" b="0"/>
+          </a:lnRef>
+          <a:fillRef idx="0">
+            <a:scrgbClr r="0" g="0" b="0"/>
+          </a:fillRef>
+          <a:effectRef idx="0">
+            <a:scrgbClr r="0" g="0" b="0"/>
+          </a:effectRef>
+          <a:fontRef idx="none"/>
+        </p:style>
+        <p:txBody>
+          <a:bodyPr rot="0" spcFirstLastPara="1" vertOverflow="overflow" horzOverflow="overflow" vert="horz" wrap="square" lIns="50800" tIns="50800" rIns="50800" bIns="50800" numCol="1" spcCol="38100" rtlCol="0" anchor="ctr">
+            <a:spAutoFit/>
+          </a:bodyPr>
+          <a:lstStyle/>
+          <a:p>
+            <a:pPr marL="0" marR="0" indent="0" algn="ctr" defTabSz="825500" rtl="0" fontAlgn="auto" latinLnBrk="0" hangingPunct="0">
+              <a:lnSpc>
+                <a:spcPct val="120000"/>
+              </a:lnSpc>
+              <a:spcBef>
+                <a:spcPts val="0"/>
+              </a:spcBef>
+              <a:spcAft>
+                <a:spcPts val="0"/>
+              </a:spcAft>
+              <a:buClrTx/>
+              <a:buSzTx/>
+              <a:buFontTx/>
+              <a:buNone/>
+              <a:tabLst/>
+            </a:pPr>
+            <a:endParaRPr kumimoji="0" lang="en-US" sz="3000" b="0" i="0" u="none" strike="noStrike" cap="all" spc="0" normalizeH="0" baseline="0">
+              <a:ln>
+                <a:noFill/>
+              </a:ln>
+              <a:solidFill>
+                <a:srgbClr val="FFFFFF"/>
+              </a:solidFill>
+              <a:effectLst/>
+              <a:uFillTx/>
+              <a:latin typeface="Proxima Nova Extrabold"/>
+              <a:ea typeface="Proxima Nova Extrabold"/>
+              <a:cs typeface="Proxima Nova Extrabold"/>
+              <a:sym typeface="Proxima Nova Extrabold"/>
+            </a:endParaRPr>
+          </a:p>
+        </p:txBody>
+      </p:sp>
       <p:sp>
         <p:nvSpPr>
           <p:cNvPr id="6" name="Tips for solving questions">
@@ -13974,6 +15416,87 @@
           <a:chExt cx="0" cy="0"/>
         </a:xfrm>
       </p:grpSpPr>
+      <p:sp>
+        <p:nvSpPr>
+          <p:cNvPr id="4" name="Oval 3">
+            <a:extLst>
+              <a:ext uri="{FF2B5EF4-FFF2-40B4-BE49-F238E27FC236}">
+                <a16:creationId xmlns:a16="http://schemas.microsoft.com/office/drawing/2014/main" id="{C3CAC663-C926-250B-9EE4-BED730CB19CC}"/>
+              </a:ext>
+            </a:extLst>
+          </p:cNvPr>
+          <p:cNvSpPr/>
+          <p:nvPr/>
+        </p:nvSpPr>
+        <p:spPr>
+          <a:xfrm>
+            <a:off x="21099632" y="1589314"/>
+            <a:ext cx="2520000" cy="2520000"/>
+          </a:xfrm>
+          <a:prstGeom prst="ellipse">
+            <a:avLst/>
+          </a:prstGeom>
+          <a:solidFill>
+            <a:srgbClr val="FF87BB"/>
+          </a:solidFill>
+          <a:ln w="12700" cap="flat">
+            <a:noFill/>
+            <a:miter lim="400000"/>
+          </a:ln>
+          <a:effectLst/>
+          <a:sp3d/>
+        </p:spPr>
+        <p:style>
+          <a:lnRef idx="0">
+            <a:scrgbClr r="0" g="0" b="0"/>
+          </a:lnRef>
+          <a:fillRef idx="0">
+            <a:scrgbClr r="0" g="0" b="0"/>
+          </a:fillRef>
+          <a:effectRef idx="0">
+            <a:scrgbClr r="0" g="0" b="0"/>
+          </a:effectRef>
+          <a:fontRef idx="none"/>
+        </p:style>
+        <p:txBody>
+          <a:bodyPr rot="0" spcFirstLastPara="1" vertOverflow="overflow" horzOverflow="overflow" vert="horz" wrap="square" lIns="50800" tIns="50800" rIns="50800" bIns="50800" numCol="1" spcCol="38100" rtlCol="0" anchor="ctr">
+            <a:spAutoFit/>
+          </a:bodyPr>
+          <a:lstStyle/>
+          <a:p>
+            <a:pPr marL="0" marR="0" indent="0" algn="ctr" defTabSz="825500" rtl="0" fontAlgn="auto" latinLnBrk="0" hangingPunct="0">
+              <a:lnSpc>
+                <a:spcPct val="120000"/>
+              </a:lnSpc>
+              <a:spcBef>
+                <a:spcPts val="0"/>
+              </a:spcBef>
+              <a:spcAft>
+                <a:spcPts val="0"/>
+              </a:spcAft>
+              <a:buClrTx/>
+              <a:buSzTx/>
+              <a:buFontTx/>
+              <a:buNone/>
+              <a:tabLst/>
+            </a:pPr>
+            <a:endParaRPr kumimoji="0" lang="en-US" sz="3000" b="0" i="0" u="none" strike="noStrike" cap="all" spc="0" normalizeH="0" baseline="0">
+              <a:ln>
+                <a:noFill/>
+              </a:ln>
+              <a:solidFill>
+                <a:srgbClr val="FFFFFF"/>
+              </a:solidFill>
+              <a:effectLst/>
+              <a:uFillTx/>
+              <a:latin typeface="Proxima Nova Extrabold"/>
+              <a:ea typeface="Proxima Nova Extrabold"/>
+              <a:cs typeface="Proxima Nova Extrabold"/>
+              <a:sym typeface="Proxima Nova Extrabold"/>
+            </a:endParaRPr>
+          </a:p>
+        </p:txBody>
+      </p:sp>
       <p:sp>
         <p:nvSpPr>
           <p:cNvPr id="6" name="Tips for solving questions">
@@ -14751,6 +16274,87 @@
           <a:chExt cx="0" cy="0"/>
         </a:xfrm>
       </p:grpSpPr>
+      <p:sp>
+        <p:nvSpPr>
+          <p:cNvPr id="4" name="Oval 3">
+            <a:extLst>
+              <a:ext uri="{FF2B5EF4-FFF2-40B4-BE49-F238E27FC236}">
+                <a16:creationId xmlns:a16="http://schemas.microsoft.com/office/drawing/2014/main" id="{DF81D951-22DF-12F1-E386-A34C60BCC9C8}"/>
+              </a:ext>
+            </a:extLst>
+          </p:cNvPr>
+          <p:cNvSpPr/>
+          <p:nvPr/>
+        </p:nvSpPr>
+        <p:spPr>
+          <a:xfrm>
+            <a:off x="21099632" y="1589314"/>
+            <a:ext cx="2520000" cy="2520000"/>
+          </a:xfrm>
+          <a:prstGeom prst="ellipse">
+            <a:avLst/>
+          </a:prstGeom>
+          <a:solidFill>
+            <a:srgbClr val="FF87BB"/>
+          </a:solidFill>
+          <a:ln w="12700" cap="flat">
+            <a:noFill/>
+            <a:miter lim="400000"/>
+          </a:ln>
+          <a:effectLst/>
+          <a:sp3d/>
+        </p:spPr>
+        <p:style>
+          <a:lnRef idx="0">
+            <a:scrgbClr r="0" g="0" b="0"/>
+          </a:lnRef>
+          <a:fillRef idx="0">
+            <a:scrgbClr r="0" g="0" b="0"/>
+          </a:fillRef>
+          <a:effectRef idx="0">
+            <a:scrgbClr r="0" g="0" b="0"/>
+          </a:effectRef>
+          <a:fontRef idx="none"/>
+        </p:style>
+        <p:txBody>
+          <a:bodyPr rot="0" spcFirstLastPara="1" vertOverflow="overflow" horzOverflow="overflow" vert="horz" wrap="square" lIns="50800" tIns="50800" rIns="50800" bIns="50800" numCol="1" spcCol="38100" rtlCol="0" anchor="ctr">
+            <a:spAutoFit/>
+          </a:bodyPr>
+          <a:lstStyle/>
+          <a:p>
+            <a:pPr marL="0" marR="0" indent="0" algn="ctr" defTabSz="825500" rtl="0" fontAlgn="auto" latinLnBrk="0" hangingPunct="0">
+              <a:lnSpc>
+                <a:spcPct val="120000"/>
+              </a:lnSpc>
+              <a:spcBef>
+                <a:spcPts val="0"/>
+              </a:spcBef>
+              <a:spcAft>
+                <a:spcPts val="0"/>
+              </a:spcAft>
+              <a:buClrTx/>
+              <a:buSzTx/>
+              <a:buFontTx/>
+              <a:buNone/>
+              <a:tabLst/>
+            </a:pPr>
+            <a:endParaRPr kumimoji="0" lang="en-US" sz="3000" b="0" i="0" u="none" strike="noStrike" cap="all" spc="0" normalizeH="0" baseline="0">
+              <a:ln>
+                <a:noFill/>
+              </a:ln>
+              <a:solidFill>
+                <a:srgbClr val="FFFFFF"/>
+              </a:solidFill>
+              <a:effectLst/>
+              <a:uFillTx/>
+              <a:latin typeface="Proxima Nova Extrabold"/>
+              <a:ea typeface="Proxima Nova Extrabold"/>
+              <a:cs typeface="Proxima Nova Extrabold"/>
+              <a:sym typeface="Proxima Nova Extrabold"/>
+            </a:endParaRPr>
+          </a:p>
+        </p:txBody>
+      </p:sp>
       <p:sp>
         <p:nvSpPr>
           <p:cNvPr id="6" name="Tips for solving questions">
@@ -15534,6 +17138,87 @@
           <a:chExt cx="0" cy="0"/>
         </a:xfrm>
       </p:grpSpPr>
+      <p:sp>
+        <p:nvSpPr>
+          <p:cNvPr id="4" name="Oval 3">
+            <a:extLst>
+              <a:ext uri="{FF2B5EF4-FFF2-40B4-BE49-F238E27FC236}">
+                <a16:creationId xmlns:a16="http://schemas.microsoft.com/office/drawing/2014/main" id="{1E3F9C1D-89F2-0819-CD9C-51E01FDFC5D9}"/>
+              </a:ext>
+            </a:extLst>
+          </p:cNvPr>
+          <p:cNvSpPr/>
+          <p:nvPr/>
+        </p:nvSpPr>
+        <p:spPr>
+          <a:xfrm>
+            <a:off x="21099632" y="1589314"/>
+            <a:ext cx="2520000" cy="2520000"/>
+          </a:xfrm>
+          <a:prstGeom prst="ellipse">
+            <a:avLst/>
+          </a:prstGeom>
+          <a:solidFill>
+            <a:srgbClr val="FF87BB"/>
+          </a:solidFill>
+          <a:ln w="12700" cap="flat">
+            <a:noFill/>
+            <a:miter lim="400000"/>
+          </a:ln>
+          <a:effectLst/>
+          <a:sp3d/>
+        </p:spPr>
+        <p:style>
+          <a:lnRef idx="0">
+            <a:scrgbClr r="0" g="0" b="0"/>
+          </a:lnRef>
+          <a:fillRef idx="0">
+            <a:scrgbClr r="0" g="0" b="0"/>
+          </a:fillRef>
+          <a:effectRef idx="0">
+            <a:scrgbClr r="0" g="0" b="0"/>
+          </a:effectRef>
+          <a:fontRef idx="none"/>
+        </p:style>
+        <p:txBody>
+          <a:bodyPr rot="0" spcFirstLastPara="1" vertOverflow="overflow" horzOverflow="overflow" vert="horz" wrap="square" lIns="50800" tIns="50800" rIns="50800" bIns="50800" numCol="1" spcCol="38100" rtlCol="0" anchor="ctr">
+            <a:spAutoFit/>
+          </a:bodyPr>
+          <a:lstStyle/>
+          <a:p>
+            <a:pPr marL="0" marR="0" indent="0" algn="ctr" defTabSz="825500" rtl="0" fontAlgn="auto" latinLnBrk="0" hangingPunct="0">
+              <a:lnSpc>
+                <a:spcPct val="120000"/>
+              </a:lnSpc>
+              <a:spcBef>
+                <a:spcPts val="0"/>
+              </a:spcBef>
+              <a:spcAft>
+                <a:spcPts val="0"/>
+              </a:spcAft>
+              <a:buClrTx/>
+              <a:buSzTx/>
+              <a:buFontTx/>
+              <a:buNone/>
+              <a:tabLst/>
+            </a:pPr>
+            <a:endParaRPr kumimoji="0" lang="en-US" sz="3000" b="0" i="0" u="none" strike="noStrike" cap="all" spc="0" normalizeH="0" baseline="0">
+              <a:ln>
+                <a:noFill/>
+              </a:ln>
+              <a:solidFill>
+                <a:srgbClr val="FFFFFF"/>
+              </a:solidFill>
+              <a:effectLst/>
+              <a:uFillTx/>
+              <a:latin typeface="Proxima Nova Extrabold"/>
+              <a:ea typeface="Proxima Nova Extrabold"/>
+              <a:cs typeface="Proxima Nova Extrabold"/>
+              <a:sym typeface="Proxima Nova Extrabold"/>
+            </a:endParaRPr>
+          </a:p>
+        </p:txBody>
+      </p:sp>
       <p:sp>
         <p:nvSpPr>
           <p:cNvPr id="6" name="Tips for solving questions">

</xml_diff>